<commit_message>
Added Betting feature (bets.py)
</commit_message>
<xml_diff>
--- a/blackjack/blackjack_flowchart.pptx
+++ b/blackjack/blackjack_flowchart.pptx
@@ -104,6 +104,11 @@
       </a:defRPr>
     </a:lvl9pPr>
   </p:defaultTextStyle>
+  <p:extLst>
+    <p:ext uri="{EFAFB233-063F-42B5-8137-9DF3F51BA10A}">
+      <p15:sldGuideLst xmlns:p15="http://schemas.microsoft.com/office/powerpoint/2012/main"/>
+    </p:ext>
+  </p:extLst>
 </p:presentation>
 </file>
 
@@ -422,7 +427,7 @@
             <a:fld id="{73C3BD54-29B9-3D42-B178-776ED395AA85}" type="datetimeFigureOut">
               <a:rPr lang="en-US" smtClean="0"/>
               <a:pPr/>
-              <a:t>12/23/2021</a:t>
+              <a:t>12/25/2021</a:t>
             </a:fld>
             <a:endParaRPr lang="en-US" sz="1400"/>
           </a:p>
@@ -672,7 +677,7 @@
           <a:p>
             <a:fld id="{73C3BD54-29B9-3D42-B178-776ED395AA85}" type="datetimeFigureOut">
               <a:rPr lang="en-US" smtClean="0"/>
-              <a:t>12/23/2021</a:t>
+              <a:t>12/25/2021</a:t>
             </a:fld>
             <a:endParaRPr lang="en-US"/>
           </a:p>
@@ -986,7 +991,7 @@
           <a:p>
             <a:fld id="{73C3BD54-29B9-3D42-B178-776ED395AA85}" type="datetimeFigureOut">
               <a:rPr lang="en-US" smtClean="0"/>
-              <a:t>12/23/2021</a:t>
+              <a:t>12/25/2021</a:t>
             </a:fld>
             <a:endParaRPr lang="en-US"/>
           </a:p>
@@ -1500,7 +1505,7 @@
           <a:p>
             <a:fld id="{73C3BD54-29B9-3D42-B178-776ED395AA85}" type="datetimeFigureOut">
               <a:rPr lang="en-US" smtClean="0"/>
-              <a:t>12/23/2021</a:t>
+              <a:t>12/25/2021</a:t>
             </a:fld>
             <a:endParaRPr lang="en-US"/>
           </a:p>
@@ -1931,7 +1936,7 @@
           <a:p>
             <a:fld id="{73C3BD54-29B9-3D42-B178-776ED395AA85}" type="datetimeFigureOut">
               <a:rPr lang="en-US" smtClean="0"/>
-              <a:t>12/23/2021</a:t>
+              <a:t>12/25/2021</a:t>
             </a:fld>
             <a:endParaRPr lang="en-US"/>
           </a:p>
@@ -2196,7 +2201,7 @@
           <a:p>
             <a:fld id="{73C3BD54-29B9-3D42-B178-776ED395AA85}" type="datetimeFigureOut">
               <a:rPr lang="en-US" smtClean="0"/>
-              <a:t>12/23/2021</a:t>
+              <a:t>12/25/2021</a:t>
             </a:fld>
             <a:endParaRPr lang="en-US"/>
           </a:p>
@@ -2770,7 +2775,7 @@
           <a:p>
             <a:fld id="{73C3BD54-29B9-3D42-B178-776ED395AA85}" type="datetimeFigureOut">
               <a:rPr lang="en-US" smtClean="0"/>
-              <a:t>12/23/2021</a:t>
+              <a:t>12/25/2021</a:t>
             </a:fld>
             <a:endParaRPr lang="en-US"/>
           </a:p>
@@ -3073,7 +3078,7 @@
           <a:p>
             <a:fld id="{73C3BD54-29B9-3D42-B178-776ED395AA85}" type="datetimeFigureOut">
               <a:rPr lang="en-US" smtClean="0"/>
-              <a:t>12/23/2021</a:t>
+              <a:t>12/25/2021</a:t>
             </a:fld>
             <a:endParaRPr lang="en-US"/>
           </a:p>
@@ -3348,7 +3353,7 @@
           <a:p>
             <a:fld id="{73C3BD54-29B9-3D42-B178-776ED395AA85}" type="datetimeFigureOut">
               <a:rPr lang="en-US" smtClean="0"/>
-              <a:t>12/23/2021</a:t>
+              <a:t>12/25/2021</a:t>
             </a:fld>
             <a:endParaRPr lang="en-US"/>
           </a:p>
@@ -3819,7 +3824,7 @@
           <a:p>
             <a:fld id="{73C3BD54-29B9-3D42-B178-776ED395AA85}" type="datetimeFigureOut">
               <a:rPr lang="en-US" smtClean="0"/>
-              <a:t>12/23/2021</a:t>
+              <a:t>12/25/2021</a:t>
             </a:fld>
             <a:endParaRPr lang="en-US"/>
           </a:p>
@@ -4270,7 +4275,7 @@
           <a:p>
             <a:fld id="{73C3BD54-29B9-3D42-B178-776ED395AA85}" type="datetimeFigureOut">
               <a:rPr lang="en-US" smtClean="0"/>
-              <a:t>12/23/2021</a:t>
+              <a:t>12/25/2021</a:t>
             </a:fld>
             <a:endParaRPr lang="en-US"/>
           </a:p>
@@ -4666,7 +4671,7 @@
             <a:fld id="{73C3BD54-29B9-3D42-B178-776ED395AA85}" type="datetimeFigureOut">
               <a:rPr lang="en-US" smtClean="0"/>
               <a:pPr/>
-              <a:t>12/23/2021</a:t>
+              <a:t>12/25/2021</a:t>
             </a:fld>
             <a:endParaRPr lang="en-US" dirty="0"/>
           </a:p>
@@ -7345,6 +7350,757 @@
           </a:fontRef>
         </p:style>
       </p:cxnSp>
+      <p:sp>
+        <p:nvSpPr>
+          <p:cNvPr id="2" name="Rectangle: Top Corners Snipped 1">
+            <a:extLst>
+              <a:ext uri="{FF2B5EF4-FFF2-40B4-BE49-F238E27FC236}">
+                <a16:creationId xmlns:a16="http://schemas.microsoft.com/office/drawing/2014/main" id="{ABF5D2BB-4F54-423D-A3DE-82899DD581B1}"/>
+              </a:ext>
+            </a:extLst>
+          </p:cNvPr>
+          <p:cNvSpPr/>
+          <p:nvPr/>
+        </p:nvSpPr>
+        <p:spPr>
+          <a:xfrm>
+            <a:off x="347294" y="1271470"/>
+            <a:ext cx="855677" cy="628166"/>
+          </a:xfrm>
+          <a:prstGeom prst="snip2SameRect">
+            <a:avLst/>
+          </a:prstGeom>
+          <a:solidFill>
+            <a:srgbClr val="FFFF00"/>
+          </a:solidFill>
+        </p:spPr>
+        <p:style>
+          <a:lnRef idx="2">
+            <a:schemeClr val="accent1">
+              <a:shade val="50000"/>
+            </a:schemeClr>
+          </a:lnRef>
+          <a:fillRef idx="1">
+            <a:schemeClr val="accent1"/>
+          </a:fillRef>
+          <a:effectRef idx="0">
+            <a:schemeClr val="accent1"/>
+          </a:effectRef>
+          <a:fontRef idx="minor">
+            <a:schemeClr val="lt1"/>
+          </a:fontRef>
+        </p:style>
+        <p:txBody>
+          <a:bodyPr rtlCol="0" anchor="ctr"/>
+          <a:lstStyle/>
+          <a:p>
+            <a:pPr algn="ctr"/>
+            <a:r>
+              <a:rPr lang="en-US" sz="1000" dirty="0">
+                <a:solidFill>
+                  <a:schemeClr val="tx1"/>
+                </a:solidFill>
+              </a:rPr>
+              <a:t>Initialize wallet</a:t>
+            </a:r>
+          </a:p>
+        </p:txBody>
+      </p:sp>
+      <p:sp>
+        <p:nvSpPr>
+          <p:cNvPr id="59" name="Rectangle: Top Corners Snipped 58">
+            <a:extLst>
+              <a:ext uri="{FF2B5EF4-FFF2-40B4-BE49-F238E27FC236}">
+                <a16:creationId xmlns:a16="http://schemas.microsoft.com/office/drawing/2014/main" id="{EEE9FD61-1BC2-4B17-9F9C-30EC1F0D004F}"/>
+              </a:ext>
+            </a:extLst>
+          </p:cNvPr>
+          <p:cNvSpPr/>
+          <p:nvPr/>
+        </p:nvSpPr>
+        <p:spPr>
+          <a:xfrm>
+            <a:off x="1436894" y="1311644"/>
+            <a:ext cx="602858" cy="442568"/>
+          </a:xfrm>
+          <a:prstGeom prst="snip2SameRect">
+            <a:avLst/>
+          </a:prstGeom>
+          <a:solidFill>
+            <a:srgbClr val="FFFF00"/>
+          </a:solidFill>
+        </p:spPr>
+        <p:style>
+          <a:lnRef idx="2">
+            <a:schemeClr val="accent1">
+              <a:shade val="50000"/>
+            </a:schemeClr>
+          </a:lnRef>
+          <a:fillRef idx="1">
+            <a:schemeClr val="accent1"/>
+          </a:fillRef>
+          <a:effectRef idx="0">
+            <a:schemeClr val="accent1"/>
+          </a:effectRef>
+          <a:fontRef idx="minor">
+            <a:schemeClr val="lt1"/>
+          </a:fontRef>
+        </p:style>
+        <p:txBody>
+          <a:bodyPr rtlCol="0" anchor="ctr"/>
+          <a:lstStyle/>
+          <a:p>
+            <a:pPr algn="ctr"/>
+            <a:r>
+              <a:rPr lang="en-US" sz="1000" dirty="0">
+                <a:solidFill>
+                  <a:schemeClr val="tx1"/>
+                </a:solidFill>
+              </a:rPr>
+              <a:t>Player bet</a:t>
+            </a:r>
+          </a:p>
+        </p:txBody>
+      </p:sp>
+      <p:sp>
+        <p:nvSpPr>
+          <p:cNvPr id="3" name="Arrow: Curved Up 2">
+            <a:extLst>
+              <a:ext uri="{FF2B5EF4-FFF2-40B4-BE49-F238E27FC236}">
+                <a16:creationId xmlns:a16="http://schemas.microsoft.com/office/drawing/2014/main" id="{C6586F6A-7F22-4696-9238-722D574ECF58}"/>
+              </a:ext>
+            </a:extLst>
+          </p:cNvPr>
+          <p:cNvSpPr/>
+          <p:nvPr/>
+        </p:nvSpPr>
+        <p:spPr>
+          <a:xfrm>
+            <a:off x="1474437" y="1818551"/>
+            <a:ext cx="541749" cy="145810"/>
+          </a:xfrm>
+          <a:prstGeom prst="curvedUpArrow">
+            <a:avLst/>
+          </a:prstGeom>
+        </p:spPr>
+        <p:style>
+          <a:lnRef idx="2">
+            <a:schemeClr val="accent6">
+              <a:shade val="50000"/>
+            </a:schemeClr>
+          </a:lnRef>
+          <a:fillRef idx="1">
+            <a:schemeClr val="accent6"/>
+          </a:fillRef>
+          <a:effectRef idx="0">
+            <a:schemeClr val="accent6"/>
+          </a:effectRef>
+          <a:fontRef idx="minor">
+            <a:schemeClr val="lt1"/>
+          </a:fontRef>
+        </p:style>
+        <p:txBody>
+          <a:bodyPr rtlCol="0" anchor="ctr"/>
+          <a:lstStyle/>
+          <a:p>
+            <a:pPr algn="ctr"/>
+            <a:endParaRPr lang="en-US">
+              <a:solidFill>
+                <a:schemeClr val="tx1"/>
+              </a:solidFill>
+            </a:endParaRPr>
+          </a:p>
+        </p:txBody>
+      </p:sp>
+      <p:sp>
+        <p:nvSpPr>
+          <p:cNvPr id="62" name="Rectangle: Top Corners Snipped 61">
+            <a:extLst>
+              <a:ext uri="{FF2B5EF4-FFF2-40B4-BE49-F238E27FC236}">
+                <a16:creationId xmlns:a16="http://schemas.microsoft.com/office/drawing/2014/main" id="{4E838FBA-6104-4A50-89D2-91B8F7D62DF7}"/>
+              </a:ext>
+            </a:extLst>
+          </p:cNvPr>
+          <p:cNvSpPr/>
+          <p:nvPr/>
+        </p:nvSpPr>
+        <p:spPr>
+          <a:xfrm>
+            <a:off x="1443882" y="2024466"/>
+            <a:ext cx="602858" cy="442568"/>
+          </a:xfrm>
+          <a:prstGeom prst="snip2SameRect">
+            <a:avLst/>
+          </a:prstGeom>
+          <a:solidFill>
+            <a:srgbClr val="FFFF00"/>
+          </a:solidFill>
+        </p:spPr>
+        <p:style>
+          <a:lnRef idx="2">
+            <a:schemeClr val="accent1">
+              <a:shade val="50000"/>
+            </a:schemeClr>
+          </a:lnRef>
+          <a:fillRef idx="1">
+            <a:schemeClr val="accent1"/>
+          </a:fillRef>
+          <a:effectRef idx="0">
+            <a:schemeClr val="accent1"/>
+          </a:effectRef>
+          <a:fontRef idx="minor">
+            <a:schemeClr val="lt1"/>
+          </a:fontRef>
+        </p:style>
+        <p:txBody>
+          <a:bodyPr rtlCol="0" anchor="ctr"/>
+          <a:lstStyle/>
+          <a:p>
+            <a:pPr algn="ctr"/>
+            <a:r>
+              <a:rPr lang="en-US" sz="1000" dirty="0">
+                <a:solidFill>
+                  <a:schemeClr val="tx1"/>
+                </a:solidFill>
+              </a:rPr>
+              <a:t>Bet &gt; wallet</a:t>
+            </a:r>
+          </a:p>
+        </p:txBody>
+      </p:sp>
+      <p:cxnSp>
+        <p:nvCxnSpPr>
+          <p:cNvPr id="63" name="Straight Arrow Connector 62">
+            <a:extLst>
+              <a:ext uri="{FF2B5EF4-FFF2-40B4-BE49-F238E27FC236}">
+                <a16:creationId xmlns:a16="http://schemas.microsoft.com/office/drawing/2014/main" id="{5F71E5C7-BE06-4B08-A9E0-AC48E6FBE3C5}"/>
+              </a:ext>
+            </a:extLst>
+          </p:cNvPr>
+          <p:cNvCxnSpPr/>
+          <p:nvPr/>
+        </p:nvCxnSpPr>
+        <p:spPr>
+          <a:xfrm>
+            <a:off x="1133997" y="1585553"/>
+            <a:ext cx="411731" cy="0"/>
+          </a:xfrm>
+          <a:prstGeom prst="straightConnector1">
+            <a:avLst/>
+          </a:prstGeom>
+          <a:ln>
+            <a:tailEnd type="triangle"/>
+          </a:ln>
+        </p:spPr>
+        <p:style>
+          <a:lnRef idx="1">
+            <a:schemeClr val="accent6"/>
+          </a:lnRef>
+          <a:fillRef idx="0">
+            <a:schemeClr val="accent6"/>
+          </a:fillRef>
+          <a:effectRef idx="0">
+            <a:schemeClr val="accent6"/>
+          </a:effectRef>
+          <a:fontRef idx="minor">
+            <a:schemeClr val="tx1"/>
+          </a:fontRef>
+        </p:style>
+      </p:cxnSp>
+      <p:sp>
+        <p:nvSpPr>
+          <p:cNvPr id="65" name="Rectangle: Top Corners Snipped 64">
+            <a:extLst>
+              <a:ext uri="{FF2B5EF4-FFF2-40B4-BE49-F238E27FC236}">
+                <a16:creationId xmlns:a16="http://schemas.microsoft.com/office/drawing/2014/main" id="{E9DC0043-AA32-4D2D-91D1-83497BF02AE8}"/>
+              </a:ext>
+            </a:extLst>
+          </p:cNvPr>
+          <p:cNvSpPr/>
+          <p:nvPr/>
+        </p:nvSpPr>
+        <p:spPr>
+          <a:xfrm>
+            <a:off x="10723457" y="5754812"/>
+            <a:ext cx="602858" cy="442568"/>
+          </a:xfrm>
+          <a:prstGeom prst="snip2SameRect">
+            <a:avLst/>
+          </a:prstGeom>
+          <a:solidFill>
+            <a:srgbClr val="FFFF00"/>
+          </a:solidFill>
+        </p:spPr>
+        <p:style>
+          <a:lnRef idx="2">
+            <a:schemeClr val="accent1">
+              <a:shade val="50000"/>
+            </a:schemeClr>
+          </a:lnRef>
+          <a:fillRef idx="1">
+            <a:schemeClr val="accent1"/>
+          </a:fillRef>
+          <a:effectRef idx="0">
+            <a:schemeClr val="accent1"/>
+          </a:effectRef>
+          <a:fontRef idx="minor">
+            <a:schemeClr val="lt1"/>
+          </a:fontRef>
+        </p:style>
+        <p:txBody>
+          <a:bodyPr rtlCol="0" anchor="ctr"/>
+          <a:lstStyle/>
+          <a:p>
+            <a:pPr algn="ctr"/>
+            <a:r>
+              <a:rPr lang="en-US" sz="800" dirty="0">
+                <a:solidFill>
+                  <a:schemeClr val="tx1"/>
+                </a:solidFill>
+              </a:rPr>
+              <a:t>Add 1.5*bet</a:t>
+            </a:r>
+          </a:p>
+        </p:txBody>
+      </p:sp>
+      <p:sp>
+        <p:nvSpPr>
+          <p:cNvPr id="67" name="Rectangle: Top Corners Snipped 66">
+            <a:extLst>
+              <a:ext uri="{FF2B5EF4-FFF2-40B4-BE49-F238E27FC236}">
+                <a16:creationId xmlns:a16="http://schemas.microsoft.com/office/drawing/2014/main" id="{9F4443B4-0665-462F-A617-2F6B547C541D}"/>
+              </a:ext>
+            </a:extLst>
+          </p:cNvPr>
+          <p:cNvSpPr/>
+          <p:nvPr/>
+        </p:nvSpPr>
+        <p:spPr>
+          <a:xfrm>
+            <a:off x="8769410" y="5754812"/>
+            <a:ext cx="602858" cy="442568"/>
+          </a:xfrm>
+          <a:prstGeom prst="snip2SameRect">
+            <a:avLst/>
+          </a:prstGeom>
+          <a:solidFill>
+            <a:srgbClr val="FFFF00"/>
+          </a:solidFill>
+        </p:spPr>
+        <p:style>
+          <a:lnRef idx="2">
+            <a:schemeClr val="accent1">
+              <a:shade val="50000"/>
+            </a:schemeClr>
+          </a:lnRef>
+          <a:fillRef idx="1">
+            <a:schemeClr val="accent1"/>
+          </a:fillRef>
+          <a:effectRef idx="0">
+            <a:schemeClr val="accent1"/>
+          </a:effectRef>
+          <a:fontRef idx="minor">
+            <a:schemeClr val="lt1"/>
+          </a:fontRef>
+        </p:style>
+        <p:txBody>
+          <a:bodyPr rtlCol="0" anchor="ctr"/>
+          <a:lstStyle/>
+          <a:p>
+            <a:pPr algn="ctr"/>
+            <a:r>
+              <a:rPr lang="en-US" sz="900" dirty="0">
+                <a:solidFill>
+                  <a:schemeClr val="tx1"/>
+                </a:solidFill>
+              </a:rPr>
+              <a:t>Add bet</a:t>
+            </a:r>
+          </a:p>
+        </p:txBody>
+      </p:sp>
+      <p:sp>
+        <p:nvSpPr>
+          <p:cNvPr id="68" name="Rectangle: Top Corners Snipped 67">
+            <a:extLst>
+              <a:ext uri="{FF2B5EF4-FFF2-40B4-BE49-F238E27FC236}">
+                <a16:creationId xmlns:a16="http://schemas.microsoft.com/office/drawing/2014/main" id="{948F30AB-3D00-43AF-B89E-D4E61F1A0CE2}"/>
+              </a:ext>
+            </a:extLst>
+          </p:cNvPr>
+          <p:cNvSpPr/>
+          <p:nvPr/>
+        </p:nvSpPr>
+        <p:spPr>
+          <a:xfrm>
+            <a:off x="9776899" y="5761228"/>
+            <a:ext cx="602858" cy="442568"/>
+          </a:xfrm>
+          <a:prstGeom prst="snip2SameRect">
+            <a:avLst/>
+          </a:prstGeom>
+          <a:solidFill>
+            <a:srgbClr val="FFFF00"/>
+          </a:solidFill>
+        </p:spPr>
+        <p:style>
+          <a:lnRef idx="2">
+            <a:schemeClr val="accent1">
+              <a:shade val="50000"/>
+            </a:schemeClr>
+          </a:lnRef>
+          <a:fillRef idx="1">
+            <a:schemeClr val="accent1"/>
+          </a:fillRef>
+          <a:effectRef idx="0">
+            <a:schemeClr val="accent1"/>
+          </a:effectRef>
+          <a:fontRef idx="minor">
+            <a:schemeClr val="lt1"/>
+          </a:fontRef>
+        </p:style>
+        <p:txBody>
+          <a:bodyPr rtlCol="0" anchor="ctr"/>
+          <a:lstStyle/>
+          <a:p>
+            <a:pPr algn="ctr"/>
+            <a:r>
+              <a:rPr lang="en-US" sz="900" dirty="0">
+                <a:solidFill>
+                  <a:schemeClr val="tx1"/>
+                </a:solidFill>
+              </a:rPr>
+              <a:t>Minus</a:t>
+            </a:r>
+          </a:p>
+          <a:p>
+            <a:pPr algn="ctr"/>
+            <a:r>
+              <a:rPr lang="en-US" sz="900" dirty="0">
+                <a:solidFill>
+                  <a:schemeClr val="tx1"/>
+                </a:solidFill>
+              </a:rPr>
+              <a:t>bet</a:t>
+            </a:r>
+          </a:p>
+        </p:txBody>
+      </p:sp>
+      <p:sp>
+        <p:nvSpPr>
+          <p:cNvPr id="72" name="Diamond 71">
+            <a:extLst>
+              <a:ext uri="{FF2B5EF4-FFF2-40B4-BE49-F238E27FC236}">
+                <a16:creationId xmlns:a16="http://schemas.microsoft.com/office/drawing/2014/main" id="{68249634-3193-41A9-9901-4D9D510852EA}"/>
+              </a:ext>
+            </a:extLst>
+          </p:cNvPr>
+          <p:cNvSpPr/>
+          <p:nvPr/>
+        </p:nvSpPr>
+        <p:spPr>
+          <a:xfrm>
+            <a:off x="7681236" y="5089287"/>
+            <a:ext cx="829568" cy="602858"/>
+          </a:xfrm>
+          <a:prstGeom prst="diamond">
+            <a:avLst/>
+          </a:prstGeom>
+        </p:spPr>
+        <p:style>
+          <a:lnRef idx="2">
+            <a:schemeClr val="accent4">
+              <a:shade val="50000"/>
+            </a:schemeClr>
+          </a:lnRef>
+          <a:fillRef idx="1">
+            <a:schemeClr val="accent4"/>
+          </a:fillRef>
+          <a:effectRef idx="0">
+            <a:schemeClr val="accent4"/>
+          </a:effectRef>
+          <a:fontRef idx="minor">
+            <a:schemeClr val="lt1"/>
+          </a:fontRef>
+        </p:style>
+        <p:txBody>
+          <a:bodyPr rtlCol="0" anchor="ctr"/>
+          <a:lstStyle/>
+          <a:p>
+            <a:pPr algn="ctr"/>
+            <a:r>
+              <a:rPr lang="en-US" sz="700" dirty="0"/>
+              <a:t>Draw</a:t>
+            </a:r>
+          </a:p>
+        </p:txBody>
+      </p:sp>
+      <p:sp>
+        <p:nvSpPr>
+          <p:cNvPr id="73" name="Rectangle: Top Corners Snipped 72">
+            <a:extLst>
+              <a:ext uri="{FF2B5EF4-FFF2-40B4-BE49-F238E27FC236}">
+                <a16:creationId xmlns:a16="http://schemas.microsoft.com/office/drawing/2014/main" id="{31C93BE1-C34C-41D0-8618-91BCCC36B25B}"/>
+              </a:ext>
+            </a:extLst>
+          </p:cNvPr>
+          <p:cNvSpPr/>
+          <p:nvPr/>
+        </p:nvSpPr>
+        <p:spPr>
+          <a:xfrm>
+            <a:off x="7794591" y="5754812"/>
+            <a:ext cx="602858" cy="442568"/>
+          </a:xfrm>
+          <a:prstGeom prst="snip2SameRect">
+            <a:avLst/>
+          </a:prstGeom>
+          <a:solidFill>
+            <a:srgbClr val="FFFF00"/>
+          </a:solidFill>
+        </p:spPr>
+        <p:style>
+          <a:lnRef idx="2">
+            <a:schemeClr val="accent1">
+              <a:shade val="50000"/>
+            </a:schemeClr>
+          </a:lnRef>
+          <a:fillRef idx="1">
+            <a:schemeClr val="accent1"/>
+          </a:fillRef>
+          <a:effectRef idx="0">
+            <a:schemeClr val="accent1"/>
+          </a:effectRef>
+          <a:fontRef idx="minor">
+            <a:schemeClr val="lt1"/>
+          </a:fontRef>
+        </p:style>
+        <p:txBody>
+          <a:bodyPr rtlCol="0" anchor="ctr"/>
+          <a:lstStyle/>
+          <a:p>
+            <a:pPr algn="ctr"/>
+            <a:r>
+              <a:rPr lang="en-US" sz="800" dirty="0">
+                <a:solidFill>
+                  <a:schemeClr val="tx1"/>
+                </a:solidFill>
+              </a:rPr>
+              <a:t>No change</a:t>
+            </a:r>
+          </a:p>
+        </p:txBody>
+      </p:sp>
+      <p:sp>
+        <p:nvSpPr>
+          <p:cNvPr id="75" name="Diamond 74">
+            <a:extLst>
+              <a:ext uri="{FF2B5EF4-FFF2-40B4-BE49-F238E27FC236}">
+                <a16:creationId xmlns:a16="http://schemas.microsoft.com/office/drawing/2014/main" id="{4C59B43F-8729-4D75-99F3-7228811C419C}"/>
+              </a:ext>
+            </a:extLst>
+          </p:cNvPr>
+          <p:cNvSpPr/>
+          <p:nvPr/>
+        </p:nvSpPr>
+        <p:spPr>
+          <a:xfrm>
+            <a:off x="8653715" y="5089287"/>
+            <a:ext cx="829568" cy="602858"/>
+          </a:xfrm>
+          <a:prstGeom prst="diamond">
+            <a:avLst/>
+          </a:prstGeom>
+        </p:spPr>
+        <p:style>
+          <a:lnRef idx="2">
+            <a:schemeClr val="accent4">
+              <a:shade val="50000"/>
+            </a:schemeClr>
+          </a:lnRef>
+          <a:fillRef idx="1">
+            <a:schemeClr val="accent4"/>
+          </a:fillRef>
+          <a:effectRef idx="0">
+            <a:schemeClr val="accent4"/>
+          </a:effectRef>
+          <a:fontRef idx="minor">
+            <a:schemeClr val="lt1"/>
+          </a:fontRef>
+        </p:style>
+        <p:txBody>
+          <a:bodyPr rtlCol="0" anchor="ctr"/>
+          <a:lstStyle/>
+          <a:p>
+            <a:pPr algn="ctr"/>
+            <a:r>
+              <a:rPr lang="en-US" sz="700" dirty="0"/>
+              <a:t>WIN</a:t>
+            </a:r>
+          </a:p>
+        </p:txBody>
+      </p:sp>
+      <p:sp>
+        <p:nvSpPr>
+          <p:cNvPr id="76" name="Diamond 75">
+            <a:extLst>
+              <a:ext uri="{FF2B5EF4-FFF2-40B4-BE49-F238E27FC236}">
+                <a16:creationId xmlns:a16="http://schemas.microsoft.com/office/drawing/2014/main" id="{45F99C30-ED24-43DA-90EB-BE77B3E54CC1}"/>
+              </a:ext>
+            </a:extLst>
+          </p:cNvPr>
+          <p:cNvSpPr/>
+          <p:nvPr/>
+        </p:nvSpPr>
+        <p:spPr>
+          <a:xfrm>
+            <a:off x="9626194" y="5081544"/>
+            <a:ext cx="829568" cy="602858"/>
+          </a:xfrm>
+          <a:prstGeom prst="diamond">
+            <a:avLst/>
+          </a:prstGeom>
+        </p:spPr>
+        <p:style>
+          <a:lnRef idx="2">
+            <a:schemeClr val="accent4">
+              <a:shade val="50000"/>
+            </a:schemeClr>
+          </a:lnRef>
+          <a:fillRef idx="1">
+            <a:schemeClr val="accent4"/>
+          </a:fillRef>
+          <a:effectRef idx="0">
+            <a:schemeClr val="accent4"/>
+          </a:effectRef>
+          <a:fontRef idx="minor">
+            <a:schemeClr val="lt1"/>
+          </a:fontRef>
+        </p:style>
+        <p:txBody>
+          <a:bodyPr rtlCol="0" anchor="ctr"/>
+          <a:lstStyle/>
+          <a:p>
+            <a:pPr algn="ctr"/>
+            <a:r>
+              <a:rPr lang="en-US" sz="700" dirty="0"/>
+              <a:t>Lose</a:t>
+            </a:r>
+          </a:p>
+        </p:txBody>
+      </p:sp>
+      <p:sp>
+        <p:nvSpPr>
+          <p:cNvPr id="78" name="Diamond 77">
+            <a:extLst>
+              <a:ext uri="{FF2B5EF4-FFF2-40B4-BE49-F238E27FC236}">
+                <a16:creationId xmlns:a16="http://schemas.microsoft.com/office/drawing/2014/main" id="{62CEBD71-4F46-41EA-AABE-0A2E64369C9B}"/>
+              </a:ext>
+            </a:extLst>
+          </p:cNvPr>
+          <p:cNvSpPr/>
+          <p:nvPr/>
+        </p:nvSpPr>
+        <p:spPr>
+          <a:xfrm>
+            <a:off x="10598673" y="5068828"/>
+            <a:ext cx="829568" cy="602858"/>
+          </a:xfrm>
+          <a:prstGeom prst="diamond">
+            <a:avLst/>
+          </a:prstGeom>
+        </p:spPr>
+        <p:style>
+          <a:lnRef idx="2">
+            <a:schemeClr val="accent4">
+              <a:shade val="50000"/>
+            </a:schemeClr>
+          </a:lnRef>
+          <a:fillRef idx="1">
+            <a:schemeClr val="accent4"/>
+          </a:fillRef>
+          <a:effectRef idx="0">
+            <a:schemeClr val="accent4"/>
+          </a:effectRef>
+          <a:fontRef idx="minor">
+            <a:schemeClr val="lt1"/>
+          </a:fontRef>
+        </p:style>
+        <p:txBody>
+          <a:bodyPr rtlCol="0" anchor="ctr"/>
+          <a:lstStyle/>
+          <a:p>
+            <a:pPr algn="ctr"/>
+            <a:r>
+              <a:rPr lang="en-US" sz="700" dirty="0"/>
+              <a:t>Black</a:t>
+            </a:r>
+          </a:p>
+          <a:p>
+            <a:pPr algn="ctr"/>
+            <a:r>
+              <a:rPr lang="en-US" sz="700" dirty="0"/>
+              <a:t>Jack</a:t>
+            </a:r>
+          </a:p>
+        </p:txBody>
+      </p:sp>
+      <p:sp>
+        <p:nvSpPr>
+          <p:cNvPr id="80" name="Rectangle: Top Corners Snipped 79">
+            <a:extLst>
+              <a:ext uri="{FF2B5EF4-FFF2-40B4-BE49-F238E27FC236}">
+                <a16:creationId xmlns:a16="http://schemas.microsoft.com/office/drawing/2014/main" id="{9787B294-947A-4640-B891-C0EC495DDC95}"/>
+              </a:ext>
+            </a:extLst>
+          </p:cNvPr>
+          <p:cNvSpPr/>
+          <p:nvPr/>
+        </p:nvSpPr>
+        <p:spPr>
+          <a:xfrm>
+            <a:off x="9278016" y="215352"/>
+            <a:ext cx="816456" cy="442568"/>
+          </a:xfrm>
+          <a:prstGeom prst="snip2SameRect">
+            <a:avLst/>
+          </a:prstGeom>
+          <a:solidFill>
+            <a:srgbClr val="FFFF00"/>
+          </a:solidFill>
+        </p:spPr>
+        <p:style>
+          <a:lnRef idx="2">
+            <a:schemeClr val="accent1">
+              <a:shade val="50000"/>
+            </a:schemeClr>
+          </a:lnRef>
+          <a:fillRef idx="1">
+            <a:schemeClr val="accent1"/>
+          </a:fillRef>
+          <a:effectRef idx="0">
+            <a:schemeClr val="accent1"/>
+          </a:effectRef>
+          <a:fontRef idx="minor">
+            <a:schemeClr val="lt1"/>
+          </a:fontRef>
+        </p:style>
+        <p:txBody>
+          <a:bodyPr rtlCol="0" anchor="ctr"/>
+          <a:lstStyle/>
+          <a:p>
+            <a:pPr algn="ctr"/>
+            <a:r>
+              <a:rPr lang="en-US" sz="800" dirty="0">
+                <a:solidFill>
+                  <a:schemeClr val="tx1"/>
+                </a:solidFill>
+              </a:rPr>
+              <a:t>Wallet interactions</a:t>
+            </a:r>
+          </a:p>
+        </p:txBody>
+      </p:sp>
     </p:spTree>
     <p:extLst>
       <p:ext uri="{BB962C8B-B14F-4D97-AF65-F5344CB8AC3E}">

</xml_diff>